<commit_message>
Adjustments to PPT Slides
</commit_message>
<xml_diff>
--- a/HACKBD-presentation.pptx
+++ b/HACKBD-presentation.pptx
@@ -515,6 +515,39 @@
           <a:bodyPr/>
           <a:lstStyle/>
           <a:p>
+            <a:r>
+              <a:rPr lang="en-CA" dirty="0"/>
+              <a:t>Hello Everyone!</a:t>
+            </a:r>
+          </a:p>
+          <a:p>
+            <a:endParaRPr lang="en-CA" dirty="0"/>
+          </a:p>
+          <a:p>
+            <a:r>
+              <a:rPr lang="en-CA" dirty="0"/>
+              <a:t>I</a:t>
+            </a:r>
+            <a:r>
+              <a:rPr lang="en-CA" baseline="0" dirty="0"/>
+              <a:t> am Tim, this is Sheldon, </a:t>
+            </a:r>
+            <a:r>
+              <a:rPr lang="en-CA" baseline="0" dirty="0" err="1"/>
+              <a:t>Delan</a:t>
+            </a:r>
+            <a:r>
+              <a:rPr lang="en-CA" baseline="0" dirty="0"/>
+              <a:t>, </a:t>
+            </a:r>
+            <a:r>
+              <a:rPr lang="en-CA" baseline="0" dirty="0" err="1"/>
+              <a:t>Luli</a:t>
+            </a:r>
+            <a:r>
+              <a:rPr lang="en-CA" baseline="0" dirty="0"/>
+              <a:t>, and Geoff. We are BCIT students, we are the B team, and we are presenting our White Glove Delivery Wizard!</a:t>
+            </a:r>
             <a:endParaRPr lang="en-CA" dirty="0"/>
           </a:p>
         </p:txBody>
@@ -601,7 +634,7 @@
           <a:p>
             <a:r>
               <a:rPr lang="en-CA" dirty="0"/>
-              <a:t>Tim.</a:t>
+              <a:t>So what is White glove?</a:t>
             </a:r>
           </a:p>
           <a:p>
@@ -610,20 +643,11 @@
           <a:p>
             <a:r>
               <a:rPr lang="en-CA" dirty="0"/>
-              <a:t>So what is White glove?</a:t>
-            </a:r>
-          </a:p>
-          <a:p>
-            <a:endParaRPr lang="en-CA" dirty="0"/>
-          </a:p>
-          <a:p>
-            <a:r>
-              <a:rPr lang="en-CA" dirty="0"/>
-              <a:t>White glove is one of Build Directs premier services. Typically customer orders are dropped off at the curb. With white glove service,</a:t>
+              <a:t>White glove is a premier delivery services,</a:t>
             </a:r>
             <a:r>
               <a:rPr lang="en-CA" baseline="0" dirty="0"/>
-              <a:t> the intention is that your shipment will be delivered to EXACTLY where you want it o be.</a:t>
+              <a:t> it allows customers to have their shipment delivered anywhere they specify.</a:t>
             </a:r>
           </a:p>
           <a:p>
@@ -632,7 +656,7 @@
           <a:p>
             <a:r>
               <a:rPr lang="en-CA" baseline="0" dirty="0"/>
-              <a:t>However, not enough customers understand, or are taking advantage of this service.</a:t>
+              <a:t>It is a service customers rarely utilize, or understand. </a:t>
             </a:r>
           </a:p>
           <a:p>
@@ -641,7 +665,7 @@
           <a:p>
             <a:r>
               <a:rPr lang="en-CA" baseline="0" dirty="0"/>
-              <a:t>Furthermore, the way the system is currently structured, the customer has to call Build Direct for a shipping quote prior to placing their order.</a:t>
+              <a:t>It requires, prior to placing their order, the customer must call Build Direct for a shipping quote. </a:t>
             </a:r>
             <a:endParaRPr lang="en-CA" dirty="0"/>
           </a:p>
@@ -777,7 +801,7 @@
           <a:p>
             <a:r>
               <a:rPr lang="en-CA" baseline="0" dirty="0"/>
-              <a:t>This can anger customers, and result in a lot of post-delivery problems for Build Direct.</a:t>
+              <a:t>This can anger customers, and result in costly post-delivery problems for Build Direct.</a:t>
             </a:r>
           </a:p>
         </p:txBody>
@@ -4116,8 +4140,8 @@
         </p:nvSpPr>
         <p:spPr>
           <a:xfrm>
-            <a:off x="-344384" y="6180355"/>
-            <a:ext cx="9084623" cy="442836"/>
+            <a:off x="-385255" y="3010872"/>
+            <a:ext cx="5742293" cy="2270126"/>
           </a:xfrm>
         </p:spPr>
         <p:txBody>
@@ -4171,6 +4195,71 @@
           </a:prstGeom>
         </p:spPr>
       </p:pic>
+      <p:sp>
+        <p:nvSpPr>
+          <p:cNvPr id="4" name="TextBox 3"/>
+          <p:cNvSpPr txBox="1"/>
+          <p:nvPr/>
+        </p:nvSpPr>
+        <p:spPr>
+          <a:xfrm>
+            <a:off x="4572000" y="6381169"/>
+            <a:ext cx="7863377" cy="461665"/>
+          </a:xfrm>
+          <a:prstGeom prst="rect">
+            <a:avLst/>
+          </a:prstGeom>
+          <a:noFill/>
+        </p:spPr>
+        <p:txBody>
+          <a:bodyPr wrap="square" rtlCol="0">
+            <a:spAutoFit/>
+          </a:bodyPr>
+          <a:lstStyle/>
+          <a:p>
+            <a:r>
+              <a:rPr lang="en-CA" sz="2400" dirty="0">
+                <a:solidFill>
+                  <a:schemeClr val="bg1"/>
+                </a:solidFill>
+              </a:rPr>
+              <a:t>By Sheldon, </a:t>
+            </a:r>
+            <a:r>
+              <a:rPr lang="en-CA" sz="2400" dirty="0" err="1">
+                <a:solidFill>
+                  <a:schemeClr val="bg1"/>
+                </a:solidFill>
+              </a:rPr>
+              <a:t>Delan</a:t>
+            </a:r>
+            <a:r>
+              <a:rPr lang="en-CA" sz="2400" dirty="0">
+                <a:solidFill>
+                  <a:schemeClr val="bg1"/>
+                </a:solidFill>
+              </a:rPr>
+              <a:t>, </a:t>
+            </a:r>
+            <a:r>
+              <a:rPr lang="en-CA" sz="2400" dirty="0" err="1">
+                <a:solidFill>
+                  <a:schemeClr val="bg1"/>
+                </a:solidFill>
+              </a:rPr>
+              <a:t>Luli</a:t>
+            </a:r>
+            <a:r>
+              <a:rPr lang="en-CA" sz="2400" dirty="0">
+                <a:solidFill>
+                  <a:schemeClr val="bg1"/>
+                </a:solidFill>
+              </a:rPr>
+              <a:t>, Geoff, Tim</a:t>
+            </a:r>
+          </a:p>
+        </p:txBody>
+      </p:sp>
     </p:spTree>
     <p:extLst>
       <p:ext uri="{BB962C8B-B14F-4D97-AF65-F5344CB8AC3E}">

</xml_diff>

<commit_message>
Font changse in PPT Slides
</commit_message>
<xml_diff>
--- a/HACKBD-presentation.pptx
+++ b/HACKBD-presentation.pptx
@@ -4140,7 +4140,7 @@
         </p:nvSpPr>
         <p:spPr>
           <a:xfrm>
-            <a:off x="-385255" y="3010872"/>
+            <a:off x="-273517" y="3010872"/>
             <a:ext cx="5742293" cy="2270126"/>
           </a:xfrm>
         </p:spPr>
@@ -4152,7 +4152,7 @@
           <a:p>
             <a:pPr algn="r"/>
             <a:r>
-              <a:rPr lang="en-US" sz="2500" i="1" dirty="0">
+              <a:rPr lang="en-US" sz="2400" i="1" dirty="0">
                 <a:solidFill>
                   <a:srgbClr val="F4B019"/>
                 </a:solidFill>
@@ -4203,7 +4203,7 @@
         </p:nvSpPr>
         <p:spPr>
           <a:xfrm>
-            <a:off x="4572000" y="6381169"/>
+            <a:off x="3834580" y="6150336"/>
             <a:ext cx="7863377" cy="461665"/>
           </a:xfrm>
           <a:prstGeom prst="rect">
@@ -4222,6 +4222,7 @@
                 <a:solidFill>
                   <a:schemeClr val="bg1"/>
                 </a:solidFill>
+                <a:latin typeface="Avenir Light"/>
               </a:rPr>
               <a:t>By Sheldon, </a:t>
             </a:r>
@@ -4230,6 +4231,7 @@
                 <a:solidFill>
                   <a:schemeClr val="bg1"/>
                 </a:solidFill>
+                <a:latin typeface="Avenir Light"/>
               </a:rPr>
               <a:t>Delan</a:t>
             </a:r>
@@ -4238,6 +4240,7 @@
                 <a:solidFill>
                   <a:schemeClr val="bg1"/>
                 </a:solidFill>
+                <a:latin typeface="Avenir Light"/>
               </a:rPr>
               <a:t>, </a:t>
             </a:r>
@@ -4246,6 +4249,7 @@
                 <a:solidFill>
                   <a:schemeClr val="bg1"/>
                 </a:solidFill>
+                <a:latin typeface="Avenir Light"/>
               </a:rPr>
               <a:t>Luli</a:t>
             </a:r>
@@ -4254,6 +4258,7 @@
                 <a:solidFill>
                   <a:schemeClr val="bg1"/>
                 </a:solidFill>
+                <a:latin typeface="Avenir Light"/>
               </a:rPr>
               <a:t>, Geoff, Tim</a:t>
             </a:r>

</xml_diff>